<commit_message>
Fertige Präsentation Stand 24.06.
</commit_message>
<xml_diff>
--- a/präsentationen/Archiv/Meilenstein3_Praesentation_Entwurf_.pptx
+++ b/präsentationen/Archiv/Meilenstein3_Praesentation_Entwurf_.pptx
@@ -15867,7 +15867,7 @@
         <p:fade/>
       </p:transition>
     </mc:Choice>
-    <mc:Fallback xmlns="" xmlns:m="http://schemas.openxmlformats.org/officeDocument/2006/math" xmlns:w="http://schemas.openxmlformats.org/wordprocessingml/2006/main">
+    <mc:Fallback xmlns:w="http://schemas.openxmlformats.org/wordprocessingml/2006/main" xmlns:m="http://schemas.openxmlformats.org/officeDocument/2006/math" xmlns="">
       <p:transition spd="slow" advClick="1">
         <p:fade thruBlk="0"/>
       </p:transition>
@@ -18320,7 +18320,7 @@
         <p:fade/>
       </p:transition>
     </mc:Choice>
-    <mc:Fallback xmlns="" xmlns:m="http://schemas.openxmlformats.org/officeDocument/2006/math" xmlns:w="http://schemas.openxmlformats.org/wordprocessingml/2006/main">
+    <mc:Fallback xmlns:w="http://schemas.openxmlformats.org/wordprocessingml/2006/main" xmlns:m="http://schemas.openxmlformats.org/officeDocument/2006/math" xmlns="">
       <p:transition spd="slow" advClick="1">
         <p:fade thruBlk="0"/>
       </p:transition>

</xml_diff>